<commit_message>
Added list slides and ammended modules and variables slides
</commit_message>
<xml_diff>
--- a/Scott/Modules.pptx
+++ b/Scott/Modules.pptx
@@ -106,6 +106,11 @@
       </a:defRPr>
     </a:lvl9pPr>
   </p:defaultTextStyle>
+  <p:extLst>
+    <p:ext uri="{EFAFB233-063F-42B5-8137-9DF3F51BA10A}">
+      <p15:sldGuideLst xmlns:p15="http://schemas.microsoft.com/office/powerpoint/2012/main"/>
+    </p:ext>
+  </p:extLst>
 </p:presentation>
 </file>
 
@@ -244,7 +249,7 @@
           <a:p>
             <a:fld id="{AF045506-609A-429B-8371-38B7AB961FDC}" type="datetimeFigureOut">
               <a:rPr lang="en-GB" smtClean="0"/>
-              <a:t>30/04/2017</a:t>
+              <a:t>01/05/2017</a:t>
             </a:fld>
             <a:endParaRPr lang="en-GB"/>
           </a:p>
@@ -414,7 +419,7 @@
           <a:p>
             <a:fld id="{AF045506-609A-429B-8371-38B7AB961FDC}" type="datetimeFigureOut">
               <a:rPr lang="en-GB" smtClean="0"/>
-              <a:t>30/04/2017</a:t>
+              <a:t>01/05/2017</a:t>
             </a:fld>
             <a:endParaRPr lang="en-GB"/>
           </a:p>
@@ -594,7 +599,7 @@
           <a:p>
             <a:fld id="{AF045506-609A-429B-8371-38B7AB961FDC}" type="datetimeFigureOut">
               <a:rPr lang="en-GB" smtClean="0"/>
-              <a:t>30/04/2017</a:t>
+              <a:t>01/05/2017</a:t>
             </a:fld>
             <a:endParaRPr lang="en-GB"/>
           </a:p>
@@ -764,7 +769,7 @@
           <a:p>
             <a:fld id="{AF045506-609A-429B-8371-38B7AB961FDC}" type="datetimeFigureOut">
               <a:rPr lang="en-GB" smtClean="0"/>
-              <a:t>30/04/2017</a:t>
+              <a:t>01/05/2017</a:t>
             </a:fld>
             <a:endParaRPr lang="en-GB"/>
           </a:p>
@@ -1010,7 +1015,7 @@
           <a:p>
             <a:fld id="{AF045506-609A-429B-8371-38B7AB961FDC}" type="datetimeFigureOut">
               <a:rPr lang="en-GB" smtClean="0"/>
-              <a:t>30/04/2017</a:t>
+              <a:t>01/05/2017</a:t>
             </a:fld>
             <a:endParaRPr lang="en-GB"/>
           </a:p>
@@ -1242,7 +1247,7 @@
           <a:p>
             <a:fld id="{AF045506-609A-429B-8371-38B7AB961FDC}" type="datetimeFigureOut">
               <a:rPr lang="en-GB" smtClean="0"/>
-              <a:t>30/04/2017</a:t>
+              <a:t>01/05/2017</a:t>
             </a:fld>
             <a:endParaRPr lang="en-GB"/>
           </a:p>
@@ -1609,7 +1614,7 @@
           <a:p>
             <a:fld id="{AF045506-609A-429B-8371-38B7AB961FDC}" type="datetimeFigureOut">
               <a:rPr lang="en-GB" smtClean="0"/>
-              <a:t>30/04/2017</a:t>
+              <a:t>01/05/2017</a:t>
             </a:fld>
             <a:endParaRPr lang="en-GB"/>
           </a:p>
@@ -1727,7 +1732,7 @@
           <a:p>
             <a:fld id="{AF045506-609A-429B-8371-38B7AB961FDC}" type="datetimeFigureOut">
               <a:rPr lang="en-GB" smtClean="0"/>
-              <a:t>30/04/2017</a:t>
+              <a:t>01/05/2017</a:t>
             </a:fld>
             <a:endParaRPr lang="en-GB"/>
           </a:p>
@@ -1822,7 +1827,7 @@
           <a:p>
             <a:fld id="{AF045506-609A-429B-8371-38B7AB961FDC}" type="datetimeFigureOut">
               <a:rPr lang="en-GB" smtClean="0"/>
-              <a:t>30/04/2017</a:t>
+              <a:t>01/05/2017</a:t>
             </a:fld>
             <a:endParaRPr lang="en-GB"/>
           </a:p>
@@ -2099,7 +2104,7 @@
           <a:p>
             <a:fld id="{AF045506-609A-429B-8371-38B7AB961FDC}" type="datetimeFigureOut">
               <a:rPr lang="en-GB" smtClean="0"/>
-              <a:t>30/04/2017</a:t>
+              <a:t>01/05/2017</a:t>
             </a:fld>
             <a:endParaRPr lang="en-GB"/>
           </a:p>
@@ -2352,7 +2357,7 @@
           <a:p>
             <a:fld id="{AF045506-609A-429B-8371-38B7AB961FDC}" type="datetimeFigureOut">
               <a:rPr lang="en-GB" smtClean="0"/>
-              <a:t>30/04/2017</a:t>
+              <a:t>01/05/2017</a:t>
             </a:fld>
             <a:endParaRPr lang="en-GB"/>
           </a:p>
@@ -2565,7 +2570,7 @@
           <a:p>
             <a:fld id="{AF045506-609A-429B-8371-38B7AB961FDC}" type="datetimeFigureOut">
               <a:rPr lang="en-GB" smtClean="0"/>
-              <a:t>30/04/2017</a:t>
+              <a:t>01/05/2017</a:t>
             </a:fld>
             <a:endParaRPr lang="en-GB"/>
           </a:p>
@@ -3080,24 +3085,39 @@
           </a:bodyPr>
           <a:lstStyle/>
           <a:p>
+            <a:pPr marL="0" indent="0">
+              <a:buNone/>
+            </a:pPr>
             <a:r>
               <a:rPr lang="en-GB" sz="2400" dirty="0"/>
               <a:t>Python is called an "object-oriented programming language." This means there is a construct in Python called a module (and class) that lets you structure your software in a particular way.</a:t>
             </a:r>
           </a:p>
           <a:p>
+            <a:pPr marL="0" indent="0">
+              <a:buNone/>
+            </a:pPr>
             <a:endParaRPr lang="en-GB" sz="2400" dirty="0"/>
           </a:p>
           <a:p>
+            <a:pPr marL="0" indent="0">
+              <a:buNone/>
+            </a:pPr>
             <a:r>
               <a:rPr lang="en-GB" sz="2400" dirty="0"/>
               <a:t>Using modules, you can add consistency to your programs so that they can be used in a cleaner way.</a:t>
             </a:r>
           </a:p>
           <a:p>
+            <a:pPr marL="0" indent="0">
+              <a:buNone/>
+            </a:pPr>
             <a:endParaRPr lang="en-GB" sz="2400" dirty="0"/>
           </a:p>
           <a:p>
+            <a:pPr marL="0" indent="0">
+              <a:buNone/>
+            </a:pPr>
             <a:r>
               <a:rPr lang="en-GB" sz="2400" dirty="0"/>
               <a:t>Modules in Python are simply Python files with the .</a:t>
@@ -3180,24 +3200,28 @@
           <a:bodyPr/>
           <a:lstStyle/>
           <a:p>
+            <a:pPr marL="0" indent="0">
+              <a:buNone/>
+            </a:pPr>
             <a:r>
               <a:rPr lang="en-GB" dirty="0"/>
               <a:t>A module allows you to logically organize your Python code. Grouping related code into a module makes the code easier to understand and use.</a:t>
             </a:r>
           </a:p>
           <a:p>
+            <a:pPr marL="0" indent="0">
+              <a:buNone/>
+            </a:pPr>
             <a:endParaRPr lang="en-GB" dirty="0"/>
           </a:p>
           <a:p>
+            <a:pPr marL="0" indent="0">
+              <a:buNone/>
+            </a:pPr>
             <a:r>
               <a:rPr lang="en-GB" dirty="0"/>
-              <a:t>Modules also allow you to publish your own tools and to use other </a:t>
-            </a:r>
-            <a:r>
-              <a:rPr lang="en-GB"/>
-              <a:t>peoples published tools.</a:t>
-            </a:r>
-            <a:endParaRPr lang="en-GB" dirty="0"/>
+              <a:t>Modules also allow you to publish your own tools and to use other peoples published tools.</a:t>
+            </a:r>
           </a:p>
         </p:txBody>
       </p:sp>

</xml_diff>